<commit_message>
worked more on moves
</commit_message>
<xml_diff>
--- a/docs/IART-Eximo.pptx
+++ b/docs/IART-Eximo.pptx
@@ -121,8 +121,7 @@
 <file path=ppt/revisionInfo.xml><?xml version="1.0" encoding="utf-8"?>
 <p1510:revInfo xmlns:a="http://schemas.openxmlformats.org/drawingml/2006/main" xmlns:r="http://schemas.openxmlformats.org/officeDocument/2006/relationships" xmlns:p1510="http://schemas.microsoft.com/office/powerpoint/2015/10/main">
   <p1510:revLst>
-    <p1510:client id="{26AB22BD-A1C2-4EDD-849C-9D4F40F32517}" v="4" dt="2020-03-16T19:50:42.017"/>
-    <p1510:client id="{6C058E3A-0DFA-49EF-B216-F01535339180}" v="37" dt="2020-03-17T15:11:32.164"/>
+    <p1510:client id="{6C058E3A-0DFA-49EF-B216-F01535339180}" v="38" dt="2020-03-18T21:01:22.303"/>
   </p1510:revLst>
 </p1510:revInfo>
 </file>
@@ -131,13 +130,83 @@
 <pc:chgInfo xmlns:a="http://schemas.openxmlformats.org/drawingml/2006/main" xmlns:r="http://schemas.openxmlformats.org/officeDocument/2006/relationships" xmlns:ac="http://schemas.microsoft.com/office/drawing/2013/main/command" xmlns:pc="http://schemas.microsoft.com/office/powerpoint/2013/main/command">
   <pc:docChgLst>
     <pc:chgData name="Andre Moutas" userId="11f4dd9e3421801c" providerId="LiveId" clId="{6C058E3A-0DFA-49EF-B216-F01535339180}"/>
-    <pc:docChg chg="custSel addSld modSld">
-      <pc:chgData name="Andre Moutas" userId="11f4dd9e3421801c" providerId="LiveId" clId="{6C058E3A-0DFA-49EF-B216-F01535339180}" dt="2020-03-17T15:11:48.627" v="548" actId="1076"/>
+    <pc:docChg chg="undo custSel addSld modSld">
+      <pc:chgData name="Andre Moutas" userId="11f4dd9e3421801c" providerId="LiveId" clId="{6C058E3A-0DFA-49EF-B216-F01535339180}" dt="2020-03-18T21:08:56.666" v="1095" actId="20577"/>
       <pc:docMkLst>
         <pc:docMk/>
       </pc:docMkLst>
+      <pc:sldChg chg="modSp mod">
+        <pc:chgData name="Andre Moutas" userId="11f4dd9e3421801c" providerId="LiveId" clId="{6C058E3A-0DFA-49EF-B216-F01535339180}" dt="2020-03-18T21:01:08.249" v="554" actId="1076"/>
+        <pc:sldMkLst>
+          <pc:docMk/>
+          <pc:sldMk cId="1413487635" sldId="257"/>
+        </pc:sldMkLst>
+        <pc:spChg chg="mod">
+          <ac:chgData name="Andre Moutas" userId="11f4dd9e3421801c" providerId="LiveId" clId="{6C058E3A-0DFA-49EF-B216-F01535339180}" dt="2020-03-18T21:01:07.875" v="553" actId="1076"/>
+          <ac:spMkLst>
+            <pc:docMk/>
+            <pc:sldMk cId="1413487635" sldId="257"/>
+            <ac:spMk id="5" creationId="{A0C96B4A-52A1-4F35-B06B-3A8E4B8526CE}"/>
+          </ac:spMkLst>
+        </pc:spChg>
+        <pc:picChg chg="mod">
+          <ac:chgData name="Andre Moutas" userId="11f4dd9e3421801c" providerId="LiveId" clId="{6C058E3A-0DFA-49EF-B216-F01535339180}" dt="2020-03-18T21:01:08.249" v="554" actId="1076"/>
+          <ac:picMkLst>
+            <pc:docMk/>
+            <pc:sldMk cId="1413487635" sldId="257"/>
+            <ac:picMk id="4" creationId="{DA587FD7-ECA8-4433-BD05-89D7CFBCE229}"/>
+          </ac:picMkLst>
+        </pc:picChg>
+      </pc:sldChg>
+      <pc:sldChg chg="addSp modSp mod">
+        <pc:chgData name="Andre Moutas" userId="11f4dd9e3421801c" providerId="LiveId" clId="{6C058E3A-0DFA-49EF-B216-F01535339180}" dt="2020-03-18T21:08:56.666" v="1095" actId="20577"/>
+        <pc:sldMkLst>
+          <pc:docMk/>
+          <pc:sldMk cId="3311973236" sldId="260"/>
+        </pc:sldMkLst>
+        <pc:spChg chg="mod">
+          <ac:chgData name="Andre Moutas" userId="11f4dd9e3421801c" providerId="LiveId" clId="{6C058E3A-0DFA-49EF-B216-F01535339180}" dt="2020-03-18T21:08:56.666" v="1095" actId="20577"/>
+          <ac:spMkLst>
+            <pc:docMk/>
+            <pc:sldMk cId="3311973236" sldId="260"/>
+            <ac:spMk id="3" creationId="{82452407-B00B-402F-B670-43BBF7AA11E7}"/>
+          </ac:spMkLst>
+        </pc:spChg>
+        <pc:spChg chg="mod">
+          <ac:chgData name="Andre Moutas" userId="11f4dd9e3421801c" providerId="LiveId" clId="{6C058E3A-0DFA-49EF-B216-F01535339180}" dt="2020-03-18T21:05:30.147" v="1059" actId="1076"/>
+          <ac:spMkLst>
+            <pc:docMk/>
+            <pc:sldMk cId="3311973236" sldId="260"/>
+            <ac:spMk id="5" creationId="{7403C3D1-273B-418A-9E69-1D545AC77E6A}"/>
+          </ac:spMkLst>
+        </pc:spChg>
+        <pc:spChg chg="mod">
+          <ac:chgData name="Andre Moutas" userId="11f4dd9e3421801c" providerId="LiveId" clId="{6C058E3A-0DFA-49EF-B216-F01535339180}" dt="2020-03-18T21:08:39.108" v="1093" actId="1076"/>
+          <ac:spMkLst>
+            <pc:docMk/>
+            <pc:sldMk cId="3311973236" sldId="260"/>
+            <ac:spMk id="6" creationId="{0BB15C4A-8CD9-431C-A7BF-DC0F29BB1B6A}"/>
+          </ac:spMkLst>
+        </pc:spChg>
+        <pc:spChg chg="add mod">
+          <ac:chgData name="Andre Moutas" userId="11f4dd9e3421801c" providerId="LiveId" clId="{6C058E3A-0DFA-49EF-B216-F01535339180}" dt="2020-03-18T21:08:11.930" v="1089" actId="1076"/>
+          <ac:spMkLst>
+            <pc:docMk/>
+            <pc:sldMk cId="3311973236" sldId="260"/>
+            <ac:spMk id="7" creationId="{3C7A98C9-AB97-462D-B6C7-A15998BE28BF}"/>
+          </ac:spMkLst>
+        </pc:spChg>
+        <pc:picChg chg="mod">
+          <ac:chgData name="Andre Moutas" userId="11f4dd9e3421801c" providerId="LiveId" clId="{6C058E3A-0DFA-49EF-B216-F01535339180}" dt="2020-03-18T21:08:26.085" v="1091" actId="1076"/>
+          <ac:picMkLst>
+            <pc:docMk/>
+            <pc:sldMk cId="3311973236" sldId="260"/>
+            <ac:picMk id="2" creationId="{70FADCAE-9ACC-4D5D-B402-0509C9B0966F}"/>
+          </ac:picMkLst>
+        </pc:picChg>
+      </pc:sldChg>
       <pc:sldChg chg="addSp delSp modSp mod">
-        <pc:chgData name="Andre Moutas" userId="11f4dd9e3421801c" providerId="LiveId" clId="{6C058E3A-0DFA-49EF-B216-F01535339180}" dt="2020-03-17T15:11:48.627" v="548" actId="1076"/>
+        <pc:chgData name="Andre Moutas" userId="11f4dd9e3421801c" providerId="LiveId" clId="{6C058E3A-0DFA-49EF-B216-F01535339180}" dt="2020-03-18T20:58:18.502" v="549" actId="1076"/>
         <pc:sldMkLst>
           <pc:docMk/>
           <pc:sldMk cId="1147159589" sldId="261"/>
@@ -159,7 +228,7 @@
           </ac:spMkLst>
         </pc:spChg>
         <pc:graphicFrameChg chg="add mod modGraphic">
-          <ac:chgData name="Andre Moutas" userId="11f4dd9e3421801c" providerId="LiveId" clId="{6C058E3A-0DFA-49EF-B216-F01535339180}" dt="2020-03-17T15:11:35.364" v="547" actId="20577"/>
+          <ac:chgData name="Andre Moutas" userId="11f4dd9e3421801c" providerId="LiveId" clId="{6C058E3A-0DFA-49EF-B216-F01535339180}" dt="2020-03-18T20:58:18.502" v="549" actId="1076"/>
           <ac:graphicFrameMkLst>
             <pc:docMk/>
             <pc:sldMk cId="1147159589" sldId="261"/>
@@ -168,7 +237,7 @@
         </pc:graphicFrameChg>
       </pc:sldChg>
       <pc:sldChg chg="addSp delSp modSp add mod">
-        <pc:chgData name="Andre Moutas" userId="11f4dd9e3421801c" providerId="LiveId" clId="{6C058E3A-0DFA-49EF-B216-F01535339180}" dt="2020-03-17T14:58:18.003" v="406" actId="1076"/>
+        <pc:chgData name="Andre Moutas" userId="11f4dd9e3421801c" providerId="LiveId" clId="{6C058E3A-0DFA-49EF-B216-F01535339180}" dt="2020-03-18T20:58:26.336" v="550" actId="1076"/>
         <pc:sldMkLst>
           <pc:docMk/>
           <pc:sldMk cId="129181667" sldId="262"/>
@@ -222,7 +291,7 @@
           </ac:graphicFrameMkLst>
         </pc:graphicFrameChg>
         <pc:graphicFrameChg chg="add mod modGraphic">
-          <ac:chgData name="Andre Moutas" userId="11f4dd9e3421801c" providerId="LiveId" clId="{6C058E3A-0DFA-49EF-B216-F01535339180}" dt="2020-03-17T14:58:18.003" v="406" actId="1076"/>
+          <ac:chgData name="Andre Moutas" userId="11f4dd9e3421801c" providerId="LiveId" clId="{6C058E3A-0DFA-49EF-B216-F01535339180}" dt="2020-03-18T20:58:26.336" v="550" actId="1076"/>
           <ac:graphicFrameMkLst>
             <pc:docMk/>
             <pc:sldMk cId="129181667" sldId="262"/>
@@ -463,7 +532,7 @@
           <a:p>
             <a:fld id="{EFC4EFF7-0A14-4391-90A5-4F7FFA3E6BB6}" type="datetimeFigureOut">
               <a:rPr lang="en-GB" smtClean="0"/>
-              <a:t>17/03/2020</a:t>
+              <a:t>18/03/2020</a:t>
             </a:fld>
             <a:endParaRPr lang="en-GB"/>
           </a:p>
@@ -663,7 +732,7 @@
           <a:p>
             <a:fld id="{EFC4EFF7-0A14-4391-90A5-4F7FFA3E6BB6}" type="datetimeFigureOut">
               <a:rPr lang="en-GB" smtClean="0"/>
-              <a:t>17/03/2020</a:t>
+              <a:t>18/03/2020</a:t>
             </a:fld>
             <a:endParaRPr lang="en-GB"/>
           </a:p>
@@ -873,7 +942,7 @@
           <a:p>
             <a:fld id="{EFC4EFF7-0A14-4391-90A5-4F7FFA3E6BB6}" type="datetimeFigureOut">
               <a:rPr lang="en-GB" smtClean="0"/>
-              <a:t>17/03/2020</a:t>
+              <a:t>18/03/2020</a:t>
             </a:fld>
             <a:endParaRPr lang="en-GB"/>
           </a:p>
@@ -1073,7 +1142,7 @@
           <a:p>
             <a:fld id="{EFC4EFF7-0A14-4391-90A5-4F7FFA3E6BB6}" type="datetimeFigureOut">
               <a:rPr lang="en-GB" smtClean="0"/>
-              <a:t>17/03/2020</a:t>
+              <a:t>18/03/2020</a:t>
             </a:fld>
             <a:endParaRPr lang="en-GB"/>
           </a:p>
@@ -1349,7 +1418,7 @@
           <a:p>
             <a:fld id="{EFC4EFF7-0A14-4391-90A5-4F7FFA3E6BB6}" type="datetimeFigureOut">
               <a:rPr lang="en-GB" smtClean="0"/>
-              <a:t>17/03/2020</a:t>
+              <a:t>18/03/2020</a:t>
             </a:fld>
             <a:endParaRPr lang="en-GB"/>
           </a:p>
@@ -1617,7 +1686,7 @@
           <a:p>
             <a:fld id="{EFC4EFF7-0A14-4391-90A5-4F7FFA3E6BB6}" type="datetimeFigureOut">
               <a:rPr lang="en-GB" smtClean="0"/>
-              <a:t>17/03/2020</a:t>
+              <a:t>18/03/2020</a:t>
             </a:fld>
             <a:endParaRPr lang="en-GB"/>
           </a:p>
@@ -2032,7 +2101,7 @@
           <a:p>
             <a:fld id="{EFC4EFF7-0A14-4391-90A5-4F7FFA3E6BB6}" type="datetimeFigureOut">
               <a:rPr lang="en-GB" smtClean="0"/>
-              <a:t>17/03/2020</a:t>
+              <a:t>18/03/2020</a:t>
             </a:fld>
             <a:endParaRPr lang="en-GB"/>
           </a:p>
@@ -2174,7 +2243,7 @@
           <a:p>
             <a:fld id="{EFC4EFF7-0A14-4391-90A5-4F7FFA3E6BB6}" type="datetimeFigureOut">
               <a:rPr lang="en-GB" smtClean="0"/>
-              <a:t>17/03/2020</a:t>
+              <a:t>18/03/2020</a:t>
             </a:fld>
             <a:endParaRPr lang="en-GB"/>
           </a:p>
@@ -2287,7 +2356,7 @@
           <a:p>
             <a:fld id="{EFC4EFF7-0A14-4391-90A5-4F7FFA3E6BB6}" type="datetimeFigureOut">
               <a:rPr lang="en-GB" smtClean="0"/>
-              <a:t>17/03/2020</a:t>
+              <a:t>18/03/2020</a:t>
             </a:fld>
             <a:endParaRPr lang="en-GB"/>
           </a:p>
@@ -2600,7 +2669,7 @@
           <a:p>
             <a:fld id="{EFC4EFF7-0A14-4391-90A5-4F7FFA3E6BB6}" type="datetimeFigureOut">
               <a:rPr lang="en-GB" smtClean="0"/>
-              <a:t>17/03/2020</a:t>
+              <a:t>18/03/2020</a:t>
             </a:fld>
             <a:endParaRPr lang="en-GB"/>
           </a:p>
@@ -2889,7 +2958,7 @@
           <a:p>
             <a:fld id="{EFC4EFF7-0A14-4391-90A5-4F7FFA3E6BB6}" type="datetimeFigureOut">
               <a:rPr lang="en-GB" smtClean="0"/>
-              <a:t>17/03/2020</a:t>
+              <a:t>18/03/2020</a:t>
             </a:fld>
             <a:endParaRPr lang="en-GB"/>
           </a:p>
@@ -3132,7 +3201,7 @@
           <a:p>
             <a:fld id="{EFC4EFF7-0A14-4391-90A5-4F7FFA3E6BB6}" type="datetimeFigureOut">
               <a:rPr lang="en-GB" smtClean="0"/>
-              <a:t>17/03/2020</a:t>
+              <a:t>18/03/2020</a:t>
             </a:fld>
             <a:endParaRPr lang="en-GB"/>
           </a:p>
@@ -4705,250 +4774,627 @@
             <p:ph idx="1"/>
           </p:nvPr>
         </p:nvSpPr>
-        <p:spPr/>
-        <p:txBody>
-          <a:bodyPr/>
+        <p:spPr>
+          <a:xfrm>
+            <a:off x="838200" y="1322896"/>
+            <a:ext cx="10515600" cy="5601687"/>
+          </a:xfrm>
+        </p:spPr>
+        <p:txBody>
+          <a:bodyPr>
+            <a:normAutofit/>
+          </a:bodyPr>
           <a:lstStyle/>
           <a:p>
+            <a:pPr marL="0" indent="0" algn="just">
+              <a:buNone/>
+            </a:pPr>
+            <a:r>
+              <a:rPr lang="en-GB" sz="2000" dirty="0"/>
+              <a:t>	O </a:t>
+            </a:r>
+            <a:r>
+              <a:rPr lang="en-GB" sz="2000" dirty="0" err="1"/>
+              <a:t>estado</a:t>
+            </a:r>
+            <a:r>
+              <a:rPr lang="en-GB" sz="2000" dirty="0"/>
+              <a:t> </a:t>
+            </a:r>
+            <a:r>
+              <a:rPr lang="en-GB" sz="2000" dirty="0" err="1"/>
+              <a:t>inicial</a:t>
+            </a:r>
+            <a:r>
+              <a:rPr lang="en-GB" sz="2000" dirty="0"/>
+              <a:t> é </a:t>
+            </a:r>
+            <a:r>
+              <a:rPr lang="en-GB" sz="2000" dirty="0" err="1"/>
+              <a:t>representado</a:t>
+            </a:r>
+            <a:r>
+              <a:rPr lang="en-GB" sz="2000" dirty="0"/>
+              <a:t> por um </a:t>
+            </a:r>
+            <a:r>
+              <a:rPr lang="en-GB" sz="2000" i="1" dirty="0"/>
+              <a:t>array</a:t>
+            </a:r>
+            <a:r>
+              <a:rPr lang="en-GB" sz="2000" dirty="0"/>
+              <a:t> de </a:t>
+            </a:r>
+            <a:r>
+              <a:rPr lang="en-GB" sz="2000" dirty="0" err="1"/>
+              <a:t>inteiros</a:t>
+            </a:r>
+            <a:r>
+              <a:rPr lang="en-GB" sz="2000" dirty="0"/>
+              <a:t> de 64 </a:t>
+            </a:r>
+            <a:r>
+              <a:rPr lang="en-GB" sz="2000" dirty="0" err="1"/>
+              <a:t>elementos</a:t>
+            </a:r>
+            <a:r>
+              <a:rPr lang="en-GB" sz="2000" dirty="0"/>
+              <a:t> (</a:t>
+            </a:r>
+            <a:r>
+              <a:rPr lang="en-GB" sz="2000" dirty="0" err="1"/>
+              <a:t>representante</a:t>
+            </a:r>
+            <a:r>
+              <a:rPr lang="en-GB" sz="2000" dirty="0"/>
+              <a:t> do </a:t>
+            </a:r>
+            <a:r>
+              <a:rPr lang="en-GB" sz="2000" i="1" dirty="0"/>
+              <a:t>board</a:t>
+            </a:r>
+            <a:r>
+              <a:rPr lang="en-GB" sz="2000" dirty="0"/>
+              <a:t> 8x8), </a:t>
+            </a:r>
+            <a:r>
+              <a:rPr lang="en-GB" sz="2000" dirty="0" err="1"/>
+              <a:t>em</a:t>
+            </a:r>
+            <a:r>
+              <a:rPr lang="en-GB" sz="2000" dirty="0"/>
+              <a:t> que um 0 </a:t>
+            </a:r>
+            <a:r>
+              <a:rPr lang="en-GB" sz="2000" dirty="0" err="1"/>
+              <a:t>representa</a:t>
+            </a:r>
+            <a:r>
+              <a:rPr lang="en-GB" sz="2000" dirty="0"/>
+              <a:t> </a:t>
+            </a:r>
+            <a:r>
+              <a:rPr lang="en-GB" sz="2000" dirty="0" err="1"/>
+              <a:t>uma</a:t>
+            </a:r>
+            <a:r>
+              <a:rPr lang="en-GB" sz="2000" dirty="0"/>
+              <a:t> </a:t>
+            </a:r>
+            <a:r>
+              <a:rPr lang="en-GB" sz="2000" dirty="0" err="1"/>
+              <a:t>célula</a:t>
+            </a:r>
+            <a:r>
+              <a:rPr lang="en-GB" sz="2000" dirty="0"/>
+              <a:t> </a:t>
+            </a:r>
+            <a:r>
+              <a:rPr lang="en-GB" sz="2000" dirty="0" err="1"/>
+              <a:t>vazia</a:t>
+            </a:r>
+            <a:r>
+              <a:rPr lang="en-GB" sz="2000" dirty="0"/>
+              <a:t>, um 1 </a:t>
+            </a:r>
+            <a:r>
+              <a:rPr lang="en-GB" sz="2000" dirty="0" err="1"/>
+              <a:t>uma</a:t>
+            </a:r>
+            <a:r>
+              <a:rPr lang="en-GB" sz="2000" dirty="0"/>
+              <a:t> </a:t>
+            </a:r>
+            <a:r>
+              <a:rPr lang="en-GB" sz="2000" dirty="0" err="1"/>
+              <a:t>célula</a:t>
+            </a:r>
+            <a:r>
+              <a:rPr lang="en-GB" sz="2000" dirty="0"/>
+              <a:t> com </a:t>
+            </a:r>
+            <a:r>
+              <a:rPr lang="en-GB" sz="2000" dirty="0" err="1"/>
+              <a:t>uma</a:t>
+            </a:r>
+            <a:r>
+              <a:rPr lang="en-GB" sz="2000" dirty="0"/>
+              <a:t> </a:t>
+            </a:r>
+            <a:r>
+              <a:rPr lang="en-GB" sz="2000" dirty="0" err="1"/>
+              <a:t>peça</a:t>
+            </a:r>
+            <a:r>
+              <a:rPr lang="en-GB" sz="2000" dirty="0"/>
+              <a:t> </a:t>
+            </a:r>
+            <a:r>
+              <a:rPr lang="en-GB" sz="2000" dirty="0" err="1"/>
+              <a:t>branca</a:t>
+            </a:r>
+            <a:r>
+              <a:rPr lang="en-GB" sz="2000" dirty="0"/>
+              <a:t> e um 2 </a:t>
+            </a:r>
+            <a:r>
+              <a:rPr lang="en-GB" sz="2000" dirty="0" err="1"/>
+              <a:t>uma</a:t>
+            </a:r>
+            <a:r>
+              <a:rPr lang="en-GB" sz="2000" dirty="0"/>
+              <a:t> </a:t>
+            </a:r>
+            <a:r>
+              <a:rPr lang="en-GB" sz="2000" dirty="0" err="1"/>
+              <a:t>peça</a:t>
+            </a:r>
+            <a:r>
+              <a:rPr lang="en-GB" sz="2000" dirty="0"/>
+              <a:t> </a:t>
+            </a:r>
+            <a:r>
+              <a:rPr lang="en-GB" sz="2000" dirty="0" err="1"/>
+              <a:t>preta</a:t>
+            </a:r>
+            <a:r>
+              <a:rPr lang="en-GB" sz="2000" dirty="0"/>
+              <a:t>. </a:t>
+            </a:r>
+          </a:p>
+          <a:p>
+            <a:pPr marL="0" indent="0" algn="just">
+              <a:buNone/>
+            </a:pPr>
+            <a:r>
+              <a:rPr lang="en-GB" sz="2000" dirty="0"/>
+              <a:t>Para </a:t>
+            </a:r>
+            <a:r>
+              <a:rPr lang="en-GB" sz="2000" dirty="0" err="1"/>
+              <a:t>uma</a:t>
+            </a:r>
+            <a:r>
+              <a:rPr lang="en-GB" sz="2000" dirty="0"/>
+              <a:t> </a:t>
+            </a:r>
+            <a:r>
+              <a:rPr lang="en-GB" sz="2000" dirty="0" err="1"/>
+              <a:t>melhor</a:t>
+            </a:r>
+            <a:r>
+              <a:rPr lang="en-GB" sz="2000" dirty="0"/>
+              <a:t> </a:t>
+            </a:r>
+            <a:r>
+              <a:rPr lang="en-GB" sz="2000" dirty="0" err="1"/>
+              <a:t>legibilidade</a:t>
+            </a:r>
+            <a:r>
+              <a:rPr lang="en-GB" sz="2000" dirty="0"/>
+              <a:t>, </a:t>
+            </a:r>
+            <a:r>
+              <a:rPr lang="en-GB" sz="2000" dirty="0" err="1"/>
+              <a:t>foram</a:t>
+            </a:r>
+            <a:r>
+              <a:rPr lang="en-GB" sz="2000" dirty="0"/>
+              <a:t> </a:t>
+            </a:r>
+            <a:r>
+              <a:rPr lang="en-GB" sz="2000" dirty="0" err="1"/>
+              <a:t>definidas</a:t>
+            </a:r>
+            <a:r>
+              <a:rPr lang="en-GB" sz="2000" dirty="0"/>
+              <a:t> as </a:t>
+            </a:r>
+            <a:r>
+              <a:rPr lang="en-GB" sz="2000" dirty="0" err="1"/>
+              <a:t>seguintes</a:t>
+            </a:r>
+            <a:r>
+              <a:rPr lang="en-GB" sz="2000" dirty="0"/>
+              <a:t> </a:t>
+            </a:r>
+            <a:r>
+              <a:rPr lang="en-GB" sz="2000" dirty="0" err="1"/>
+              <a:t>constantes</a:t>
+            </a:r>
+            <a:r>
+              <a:rPr lang="en-GB" sz="2000" dirty="0"/>
+              <a:t>:</a:t>
+            </a:r>
+          </a:p>
+          <a:p>
             <a:pPr marL="0" indent="0">
               <a:buNone/>
             </a:pPr>
-            <a:r>
-              <a:rPr lang="en-GB" sz="2400" dirty="0"/>
-              <a:t>O </a:t>
-            </a:r>
-            <a:r>
-              <a:rPr lang="en-GB" sz="2400" dirty="0" err="1"/>
-              <a:t>estado</a:t>
-            </a:r>
-            <a:r>
-              <a:rPr lang="en-GB" sz="2400" dirty="0"/>
+            <a:endParaRPr lang="en-GB" sz="2400" dirty="0"/>
+          </a:p>
+          <a:p>
+            <a:pPr marL="0" indent="0">
+              <a:buNone/>
+            </a:pPr>
+            <a:endParaRPr lang="en-GB" sz="2400" dirty="0"/>
+          </a:p>
+          <a:p>
+            <a:pPr marL="0" indent="0">
+              <a:buNone/>
+            </a:pPr>
+            <a:endParaRPr lang="en-GB" sz="2400" dirty="0"/>
+          </a:p>
+          <a:p>
+            <a:pPr marL="0" indent="0">
+              <a:buNone/>
+            </a:pPr>
+            <a:endParaRPr lang="en-GB" sz="2000" dirty="0"/>
+          </a:p>
+          <a:p>
+            <a:pPr marL="0" indent="0">
+              <a:buNone/>
+            </a:pPr>
+            <a:endParaRPr lang="en-GB" sz="2000" dirty="0"/>
+          </a:p>
+          <a:p>
+            <a:pPr marL="0" indent="0" algn="just">
+              <a:lnSpc>
+                <a:spcPct val="100000"/>
+              </a:lnSpc>
+              <a:buNone/>
+            </a:pPr>
+            <a:r>
+              <a:rPr lang="en-GB" sz="2000" dirty="0"/>
+              <a:t>	A </a:t>
+            </a:r>
+            <a:r>
+              <a:rPr lang="en-GB" sz="2000" dirty="0" err="1"/>
+              <a:t>função</a:t>
+            </a:r>
+            <a:r>
+              <a:rPr lang="en-GB" sz="2000" dirty="0"/>
+              <a:t> de </a:t>
+            </a:r>
+            <a:r>
+              <a:rPr lang="en-GB" sz="2000" dirty="0" err="1"/>
+              <a:t>avaliação</a:t>
+            </a:r>
+            <a:r>
+              <a:rPr lang="en-GB" sz="2000" dirty="0"/>
+              <a:t> que </a:t>
+            </a:r>
+            <a:r>
+              <a:rPr lang="en-GB" sz="2000" dirty="0" err="1"/>
+              <a:t>irá</a:t>
+            </a:r>
+            <a:r>
+              <a:rPr lang="en-GB" sz="2000" dirty="0"/>
+              <a:t> ser </a:t>
+            </a:r>
+            <a:r>
+              <a:rPr lang="en-GB" sz="2000" dirty="0" err="1"/>
+              <a:t>utilizada</a:t>
+            </a:r>
+            <a:r>
+              <a:rPr lang="en-GB" sz="2000" dirty="0"/>
               <a:t> </a:t>
             </a:r>
             <a:r>
-              <a:rPr lang="en-GB" sz="2400" dirty="0" err="1"/>
-              <a:t>inicial</a:t>
-            </a:r>
-            <a:r>
-              <a:rPr lang="en-GB" sz="2400" dirty="0"/>
-              <a:t> é </a:t>
-            </a:r>
-            <a:r>
-              <a:rPr lang="en-GB" sz="2400" dirty="0" err="1"/>
-              <a:t>representado</a:t>
-            </a:r>
-            <a:r>
-              <a:rPr lang="en-GB" sz="2400" dirty="0"/>
-              <a:t> por um </a:t>
-            </a:r>
-            <a:r>
-              <a:rPr lang="en-GB" sz="2400" i="1" dirty="0"/>
-              <a:t>array</a:t>
-            </a:r>
-            <a:r>
-              <a:rPr lang="en-GB" sz="2400" dirty="0"/>
+              <a:rPr lang="en-GB" sz="2000" dirty="0" err="1"/>
+              <a:t>levará</a:t>
+            </a:r>
+            <a:r>
+              <a:rPr lang="en-GB" sz="2000" dirty="0"/>
+              <a:t> </a:t>
+            </a:r>
+            <a:r>
+              <a:rPr lang="en-GB" sz="2000" dirty="0" err="1"/>
+              <a:t>sobretudo</a:t>
+            </a:r>
+            <a:r>
+              <a:rPr lang="en-GB" sz="2000" dirty="0"/>
+              <a:t> </a:t>
+            </a:r>
+            <a:r>
+              <a:rPr lang="en-GB" sz="2000" dirty="0" err="1"/>
+              <a:t>em</a:t>
+            </a:r>
+            <a:r>
+              <a:rPr lang="en-GB" sz="2000" dirty="0"/>
+              <a:t> </a:t>
+            </a:r>
+            <a:r>
+              <a:rPr lang="en-GB" sz="2000" dirty="0" err="1"/>
+              <a:t>conta</a:t>
+            </a:r>
+            <a:r>
+              <a:rPr lang="en-GB" sz="2000" dirty="0"/>
+              <a:t> o </a:t>
+            </a:r>
+            <a:r>
+              <a:rPr lang="en-GB" sz="2000" dirty="0" err="1"/>
+              <a:t>número</a:t>
+            </a:r>
+            <a:r>
+              <a:rPr lang="en-GB" sz="2000" dirty="0"/>
               <a:t> de </a:t>
             </a:r>
             <a:r>
-              <a:rPr lang="en-GB" sz="2400" dirty="0" err="1"/>
-              <a:t>inteiros</a:t>
-            </a:r>
-            <a:r>
-              <a:rPr lang="en-GB" sz="2400" dirty="0"/>
-              <a:t> de 64 </a:t>
-            </a:r>
-            <a:r>
-              <a:rPr lang="en-GB" sz="2400" dirty="0" err="1"/>
-              <a:t>elementos</a:t>
-            </a:r>
-            <a:r>
-              <a:rPr lang="en-GB" sz="2400" dirty="0"/>
+              <a:rPr lang="en-GB" sz="2000" dirty="0" err="1"/>
+              <a:t>peças</a:t>
+            </a:r>
+            <a:r>
+              <a:rPr lang="en-GB" sz="2000" dirty="0"/>
+              <a:t> no </a:t>
+            </a:r>
+            <a:r>
+              <a:rPr lang="en-GB" sz="2000" dirty="0" err="1"/>
+              <a:t>tabuleiro</a:t>
+            </a:r>
+            <a:r>
+              <a:rPr lang="en-GB" sz="2000" dirty="0"/>
+              <a:t>, </a:t>
+            </a:r>
+            <a:r>
+              <a:rPr lang="en-GB" sz="2000" dirty="0" err="1"/>
+              <a:t>sendo</a:t>
+            </a:r>
+            <a:r>
+              <a:rPr lang="en-GB" sz="2000" dirty="0"/>
+              <a:t> que a </a:t>
+            </a:r>
+            <a:r>
+              <a:rPr lang="en-GB" sz="2000" dirty="0" err="1"/>
+              <a:t>avaliação</a:t>
+            </a:r>
+            <a:r>
+              <a:rPr lang="en-GB" sz="2000" dirty="0"/>
+              <a:t> </a:t>
+            </a:r>
+            <a:r>
+              <a:rPr lang="en-GB" sz="2000" dirty="0" err="1"/>
+              <a:t>será</a:t>
+            </a:r>
+            <a:r>
+              <a:rPr lang="en-GB" sz="2000" dirty="0"/>
+              <a:t> tanto </a:t>
+            </a:r>
+            <a:r>
+              <a:rPr lang="en-GB" sz="2000" dirty="0" err="1"/>
+              <a:t>maior</a:t>
+            </a:r>
+            <a:r>
+              <a:rPr lang="en-GB" sz="2000" dirty="0"/>
+              <a:t> </a:t>
+            </a:r>
+            <a:r>
+              <a:rPr lang="en-GB" sz="2000" dirty="0" err="1"/>
+              <a:t>quanto</a:t>
+            </a:r>
+            <a:r>
+              <a:rPr lang="en-GB" sz="2000" dirty="0"/>
+              <a:t> </a:t>
+            </a:r>
+            <a:r>
+              <a:rPr lang="en-GB" sz="2000" dirty="0" err="1"/>
+              <a:t>maior</a:t>
+            </a:r>
+            <a:r>
+              <a:rPr lang="en-GB" sz="2000" dirty="0"/>
+              <a:t> for </a:t>
+            </a:r>
+            <a:r>
+              <a:rPr lang="en-GB" sz="2000" dirty="0" err="1"/>
+              <a:t>esse</a:t>
+            </a:r>
+            <a:r>
+              <a:rPr lang="en-GB" sz="2000" dirty="0"/>
+              <a:t> </a:t>
+            </a:r>
+            <a:r>
+              <a:rPr lang="en-GB" sz="2000" dirty="0" err="1"/>
+              <a:t>número</a:t>
+            </a:r>
+            <a:r>
+              <a:rPr lang="en-GB" sz="2000" dirty="0"/>
+              <a:t>. No </a:t>
+            </a:r>
+            <a:r>
+              <a:rPr lang="en-GB" sz="2000" dirty="0" err="1"/>
+              <a:t>entanto</a:t>
+            </a:r>
+            <a:r>
+              <a:rPr lang="en-GB" sz="2000" dirty="0"/>
+              <a:t>, com </a:t>
+            </a:r>
+            <a:r>
+              <a:rPr lang="en-GB" sz="2000" dirty="0" err="1"/>
+              <a:t>menor</a:t>
+            </a:r>
+            <a:r>
+              <a:rPr lang="en-GB" sz="2000" dirty="0"/>
+              <a:t> peso, </a:t>
+            </a:r>
+            <a:r>
+              <a:rPr lang="en-GB" sz="2000" dirty="0" err="1"/>
+              <a:t>será</a:t>
+            </a:r>
+            <a:r>
+              <a:rPr lang="en-GB" sz="2000" dirty="0"/>
+              <a:t> </a:t>
+            </a:r>
+            <a:r>
+              <a:rPr lang="en-GB" sz="2000" dirty="0" err="1"/>
+              <a:t>também</a:t>
+            </a:r>
+            <a:r>
+              <a:rPr lang="en-GB" sz="2000" dirty="0"/>
+              <a:t> </a:t>
+            </a:r>
+            <a:r>
+              <a:rPr lang="en-GB" sz="2000" dirty="0" err="1"/>
+              <a:t>avaliada</a:t>
+            </a:r>
+            <a:r>
+              <a:rPr lang="en-GB" sz="2000" dirty="0"/>
+              <a:t> a </a:t>
+            </a:r>
+            <a:r>
+              <a:rPr lang="en-GB" sz="2000" dirty="0" err="1"/>
+              <a:t>posição</a:t>
+            </a:r>
+            <a:r>
+              <a:rPr lang="en-GB" sz="2000" dirty="0"/>
+              <a:t> das </a:t>
+            </a:r>
+            <a:r>
+              <a:rPr lang="en-GB" sz="2000" dirty="0" err="1"/>
+              <a:t>peças</a:t>
+            </a:r>
+            <a:r>
+              <a:rPr lang="en-GB" sz="2000" dirty="0"/>
               <a:t> (</a:t>
             </a:r>
             <a:r>
-              <a:rPr lang="en-GB" sz="2400" dirty="0" err="1"/>
-              <a:t>representante</a:t>
-            </a:r>
-            <a:r>
-              <a:rPr lang="en-GB" sz="2400" dirty="0"/>
+              <a:rPr lang="en-GB" sz="2000" dirty="0" err="1"/>
+              <a:t>sendo</a:t>
+            </a:r>
+            <a:r>
+              <a:rPr lang="en-GB" sz="2000" dirty="0"/>
+              <a:t> </a:t>
+            </a:r>
+            <a:r>
+              <a:rPr lang="en-GB" sz="2000" dirty="0" err="1"/>
+              <a:t>mais</a:t>
+            </a:r>
+            <a:r>
+              <a:rPr lang="en-GB" sz="2000" dirty="0"/>
+              <a:t> </a:t>
+            </a:r>
+            <a:r>
+              <a:rPr lang="en-GB" sz="2000" dirty="0" err="1"/>
+              <a:t>favorável</a:t>
+            </a:r>
+            <a:r>
+              <a:rPr lang="en-GB" sz="2000" dirty="0"/>
+              <a:t> </a:t>
+            </a:r>
+            <a:r>
+              <a:rPr lang="en-GB" sz="2000" dirty="0" err="1"/>
+              <a:t>quando</a:t>
+            </a:r>
+            <a:r>
+              <a:rPr lang="en-GB" sz="2000" dirty="0"/>
+              <a:t> se </a:t>
+            </a:r>
+            <a:r>
+              <a:rPr lang="en-GB" sz="2000" dirty="0" err="1"/>
+              <a:t>encontram</a:t>
+            </a:r>
+            <a:r>
+              <a:rPr lang="en-GB" sz="2000" dirty="0"/>
+              <a:t> </a:t>
+            </a:r>
+            <a:r>
+              <a:rPr lang="en-GB" sz="2000" dirty="0" err="1"/>
+              <a:t>mais</a:t>
+            </a:r>
+            <a:r>
+              <a:rPr lang="en-GB" sz="2000" dirty="0"/>
+              <a:t> </a:t>
+            </a:r>
+            <a:r>
+              <a:rPr lang="en-GB" sz="2000" dirty="0" err="1"/>
+              <a:t>perto</a:t>
+            </a:r>
+            <a:r>
+              <a:rPr lang="en-GB" sz="2000" dirty="0"/>
+              <a:t> da </a:t>
+            </a:r>
+            <a:r>
+              <a:rPr lang="en-GB" sz="2000" dirty="0" err="1"/>
+              <a:t>outra</a:t>
+            </a:r>
+            <a:r>
+              <a:rPr lang="en-GB" sz="2000" dirty="0"/>
+              <a:t> </a:t>
+            </a:r>
+            <a:r>
+              <a:rPr lang="en-GB" sz="2000" dirty="0" err="1"/>
+              <a:t>ponta</a:t>
+            </a:r>
+            <a:r>
+              <a:rPr lang="en-GB" sz="2000" dirty="0"/>
               <a:t> do </a:t>
             </a:r>
             <a:r>
-              <a:rPr lang="en-GB" sz="2400" i="1" dirty="0"/>
-              <a:t>board</a:t>
-            </a:r>
-            <a:r>
-              <a:rPr lang="en-GB" sz="2400" dirty="0"/>
-              <a:t> 8x8), </a:t>
-            </a:r>
-            <a:r>
-              <a:rPr lang="en-GB" sz="2400" dirty="0" err="1"/>
-              <a:t>em</a:t>
-            </a:r>
-            <a:r>
-              <a:rPr lang="en-GB" sz="2400" dirty="0"/>
-              <a:t> que um 0 </a:t>
-            </a:r>
-            <a:r>
-              <a:rPr lang="en-GB" sz="2400" dirty="0" err="1"/>
-              <a:t>representa</a:t>
-            </a:r>
-            <a:r>
-              <a:rPr lang="en-GB" sz="2400" dirty="0"/>
+              <a:rPr lang="en-GB" sz="2000" dirty="0" err="1"/>
+              <a:t>tabuleiro</a:t>
+            </a:r>
+            <a:r>
+              <a:rPr lang="en-GB" sz="2000" dirty="0"/>
+              <a:t>) e o </a:t>
+            </a:r>
+            <a:r>
+              <a:rPr lang="en-GB" sz="2000" dirty="0" err="1"/>
+              <a:t>número</a:t>
+            </a:r>
+            <a:r>
+              <a:rPr lang="en-GB" sz="2000" dirty="0"/>
+              <a:t> de </a:t>
+            </a:r>
+            <a:r>
+              <a:rPr lang="en-GB" sz="2000" dirty="0" err="1"/>
+              <a:t>movimentos</a:t>
+            </a:r>
+            <a:r>
+              <a:rPr lang="en-GB" sz="2000" dirty="0"/>
               <a:t> </a:t>
             </a:r>
             <a:r>
-              <a:rPr lang="en-GB" sz="2400" dirty="0" err="1"/>
-              <a:t>uma</a:t>
-            </a:r>
-            <a:r>
-              <a:rPr lang="en-GB" sz="2400" dirty="0"/>
-              <a:t> </a:t>
-            </a:r>
-            <a:r>
-              <a:rPr lang="en-GB" sz="2400" dirty="0" err="1"/>
-              <a:t>célula</a:t>
-            </a:r>
-            <a:r>
-              <a:rPr lang="en-GB" sz="2400" dirty="0"/>
-              <a:t> </a:t>
-            </a:r>
-            <a:r>
-              <a:rPr lang="en-GB" sz="2400" dirty="0" err="1"/>
-              <a:t>vazia</a:t>
-            </a:r>
-            <a:r>
-              <a:rPr lang="en-GB" sz="2400" dirty="0"/>
-              <a:t>, um 1 </a:t>
-            </a:r>
-            <a:r>
-              <a:rPr lang="en-GB" sz="2400" dirty="0" err="1"/>
-              <a:t>uma</a:t>
-            </a:r>
-            <a:r>
-              <a:rPr lang="en-GB" sz="2400" dirty="0"/>
-              <a:t> </a:t>
-            </a:r>
-            <a:r>
-              <a:rPr lang="en-GB" sz="2400" dirty="0" err="1"/>
-              <a:t>célula</a:t>
-            </a:r>
-            <a:r>
-              <a:rPr lang="en-GB" sz="2400" dirty="0"/>
-              <a:t> com </a:t>
-            </a:r>
-            <a:r>
-              <a:rPr lang="en-GB" sz="2400" dirty="0" err="1"/>
-              <a:t>uma</a:t>
-            </a:r>
-            <a:r>
-              <a:rPr lang="en-GB" sz="2400" dirty="0"/>
-              <a:t> </a:t>
-            </a:r>
-            <a:r>
-              <a:rPr lang="en-GB" sz="2400" dirty="0" err="1"/>
-              <a:t>peça</a:t>
-            </a:r>
-            <a:r>
-              <a:rPr lang="en-GB" sz="2400" dirty="0"/>
-              <a:t> </a:t>
-            </a:r>
-            <a:r>
-              <a:rPr lang="en-GB" sz="2400" dirty="0" err="1"/>
-              <a:t>branca</a:t>
-            </a:r>
-            <a:r>
-              <a:rPr lang="en-GB" sz="2400" dirty="0"/>
-              <a:t> e um 2 </a:t>
-            </a:r>
-            <a:r>
-              <a:rPr lang="en-GB" sz="2400" dirty="0" err="1"/>
-              <a:t>uma</a:t>
-            </a:r>
-            <a:r>
-              <a:rPr lang="en-GB" sz="2400" dirty="0"/>
-              <a:t> </a:t>
-            </a:r>
-            <a:r>
-              <a:rPr lang="en-GB" sz="2400" dirty="0" err="1"/>
-              <a:t>peça</a:t>
-            </a:r>
-            <a:r>
-              <a:rPr lang="en-GB" sz="2400" dirty="0"/>
-              <a:t> </a:t>
-            </a:r>
-            <a:r>
-              <a:rPr lang="en-GB" sz="2400" dirty="0" err="1"/>
-              <a:t>preta</a:t>
-            </a:r>
-            <a:r>
-              <a:rPr lang="en-GB" sz="2400" dirty="0"/>
-              <a:t>. </a:t>
-            </a:r>
-          </a:p>
-          <a:p>
-            <a:pPr marL="0" indent="0">
-              <a:buNone/>
-            </a:pPr>
-            <a:r>
-              <a:rPr lang="en-GB" sz="2400" dirty="0"/>
-              <a:t>Para </a:t>
-            </a:r>
-            <a:r>
-              <a:rPr lang="en-GB" sz="2400" dirty="0" err="1"/>
-              <a:t>uma</a:t>
-            </a:r>
-            <a:r>
-              <a:rPr lang="en-GB" sz="2400" dirty="0"/>
-              <a:t> </a:t>
-            </a:r>
-            <a:r>
-              <a:rPr lang="en-GB" sz="2400" dirty="0" err="1"/>
-              <a:t>melhor</a:t>
-            </a:r>
-            <a:r>
-              <a:rPr lang="en-GB" sz="2400" dirty="0"/>
-              <a:t> </a:t>
-            </a:r>
-            <a:r>
-              <a:rPr lang="en-GB" sz="2400" dirty="0" err="1"/>
-              <a:t>legibilidade</a:t>
-            </a:r>
-            <a:r>
-              <a:rPr lang="en-GB" sz="2400" dirty="0"/>
-              <a:t>, </a:t>
-            </a:r>
-            <a:r>
-              <a:rPr lang="en-GB" sz="2400" dirty="0" err="1"/>
-              <a:t>foram</a:t>
-            </a:r>
-            <a:r>
-              <a:rPr lang="en-GB" sz="2400" dirty="0"/>
-              <a:t> </a:t>
-            </a:r>
-            <a:r>
-              <a:rPr lang="en-GB" sz="2400" dirty="0" err="1"/>
-              <a:t>definidas</a:t>
-            </a:r>
-            <a:r>
-              <a:rPr lang="en-GB" sz="2400" dirty="0"/>
-              <a:t> as </a:t>
-            </a:r>
-            <a:r>
-              <a:rPr lang="en-GB" sz="2400" dirty="0" err="1"/>
-              <a:t>seguintes</a:t>
-            </a:r>
-            <a:r>
-              <a:rPr lang="en-GB" sz="2400" dirty="0"/>
-              <a:t> </a:t>
-            </a:r>
-            <a:r>
-              <a:rPr lang="en-GB" sz="2400" dirty="0" err="1"/>
-              <a:t>constantes</a:t>
-            </a:r>
-            <a:r>
-              <a:rPr lang="en-GB" sz="2400" dirty="0"/>
-              <a:t>: </a:t>
+              <a:rPr lang="en-GB" sz="2000" dirty="0" err="1"/>
+              <a:t>possíveis</a:t>
+            </a:r>
+            <a:r>
+              <a:rPr lang="en-GB" sz="2000" dirty="0"/>
+              <a:t> (</a:t>
+            </a:r>
+            <a:r>
+              <a:rPr lang="en-GB" sz="2000" dirty="0" err="1"/>
+              <a:t>proporcional</a:t>
+            </a:r>
+            <a:r>
+              <a:rPr lang="en-GB" sz="2000" dirty="0"/>
+              <a:t> à </a:t>
+            </a:r>
+            <a:r>
+              <a:rPr lang="en-GB" sz="2000" dirty="0" err="1"/>
+              <a:t>avaliação</a:t>
+            </a:r>
+            <a:r>
+              <a:rPr lang="en-GB" sz="2000" dirty="0"/>
+              <a:t>).</a:t>
             </a:r>
           </a:p>
           <a:p>
@@ -4981,8 +5427,8 @@
         </p:blipFill>
         <p:spPr>
           <a:xfrm>
-            <a:off x="4066862" y="4211924"/>
-            <a:ext cx="4058276" cy="1656216"/>
+            <a:off x="6898838" y="2797070"/>
+            <a:ext cx="3727734" cy="1521319"/>
           </a:xfrm>
           <a:prstGeom prst="rect">
             <a:avLst/>
@@ -5007,7 +5453,7 @@
         </p:nvSpPr>
         <p:spPr>
           <a:xfrm>
-            <a:off x="838200" y="365125"/>
+            <a:off x="838200" y="0"/>
             <a:ext cx="10515600" cy="1325563"/>
           </a:xfrm>
         </p:spPr>
@@ -5037,8 +5483,8 @@
         </p:nvSpPr>
         <p:spPr>
           <a:xfrm>
-            <a:off x="4066862" y="5868140"/>
-            <a:ext cx="4433609" cy="338554"/>
+            <a:off x="6810064" y="4318389"/>
+            <a:ext cx="4433609" cy="323165"/>
           </a:xfrm>
           <a:prstGeom prst="rect">
             <a:avLst/>
@@ -5052,14 +5498,72 @@
           <a:lstStyle/>
           <a:p>
             <a:r>
-              <a:rPr lang="pt-PT" sz="1600" dirty="0"/>
+              <a:rPr lang="pt-PT" sz="1500" dirty="0"/>
               <a:t>Figura 2 – Excerto de código da classe </a:t>
             </a:r>
             <a:r>
-              <a:rPr lang="pt-PT" sz="1600" dirty="0" err="1"/>
+              <a:rPr lang="pt-PT" sz="1500" dirty="0" err="1"/>
               <a:t>Constants</a:t>
             </a:r>
-            <a:endParaRPr lang="pt-PT" sz="1600" dirty="0"/>
+            <a:endParaRPr lang="pt-PT" sz="1500" dirty="0"/>
+          </a:p>
+        </p:txBody>
+      </p:sp>
+      <p:sp>
+        <p:nvSpPr>
+          <p:cNvPr id="7" name="Título 1">
+            <a:extLst>
+              <a:ext uri="{FF2B5EF4-FFF2-40B4-BE49-F238E27FC236}">
+                <a16:creationId xmlns:a16="http://schemas.microsoft.com/office/drawing/2014/main" id="{3C7A98C9-AB97-462D-B6C7-A15998BE28BF}"/>
+              </a:ext>
+            </a:extLst>
+          </p:cNvPr>
+          <p:cNvSpPr txBox="1">
+            <a:spLocks/>
+          </p:cNvSpPr>
+          <p:nvPr/>
+        </p:nvSpPr>
+        <p:spPr>
+          <a:xfrm>
+            <a:off x="838200" y="3331380"/>
+            <a:ext cx="10515600" cy="1325563"/>
+          </a:xfrm>
+          <a:prstGeom prst="rect">
+            <a:avLst/>
+          </a:prstGeom>
+        </p:spPr>
+        <p:txBody>
+          <a:bodyPr vert="horz" lIns="91440" tIns="45720" rIns="91440" bIns="45720" rtlCol="0" anchor="ctr">
+            <a:normAutofit/>
+          </a:bodyPr>
+          <a:lstStyle>
+            <a:lvl1pPr algn="l" defTabSz="914400" rtl="0" eaLnBrk="1" latinLnBrk="0" hangingPunct="1">
+              <a:lnSpc>
+                <a:spcPct val="90000"/>
+              </a:lnSpc>
+              <a:spcBef>
+                <a:spcPct val="0"/>
+              </a:spcBef>
+              <a:buNone/>
+              <a:defRPr sz="4400" kern="1200">
+                <a:solidFill>
+                  <a:schemeClr val="tx1"/>
+                </a:solidFill>
+                <a:latin typeface="+mj-lt"/>
+                <a:ea typeface="+mj-ea"/>
+                <a:cs typeface="+mj-cs"/>
+              </a:defRPr>
+            </a:lvl1pPr>
+          </a:lstStyle>
+          <a:p>
+            <a:endParaRPr lang="pt-PT" b="1" dirty="0"/>
+          </a:p>
+          <a:p>
+            <a:r>
+              <a:rPr lang="pt-PT" b="1" dirty="0"/>
+              <a:t>Função de Avaliação</a:t>
+            </a:r>
+            <a:endParaRPr lang="en-GB" b="1" dirty="0"/>
           </a:p>
         </p:txBody>
       </p:sp>
@@ -5163,13 +5667,13 @@
           <p:nvPr>
             <p:extLst>
               <p:ext uri="{D42A27DB-BD31-4B8C-83A1-F6EECF244321}">
-                <p14:modId xmlns:p14="http://schemas.microsoft.com/office/powerpoint/2010/main" val="2198765880"/>
+                <p14:modId xmlns:p14="http://schemas.microsoft.com/office/powerpoint/2010/main" val="844299363"/>
               </p:ext>
             </p:extLst>
           </p:nvPr>
         </p:nvGraphicFramePr>
         <p:xfrm>
-          <a:off x="838200" y="1576758"/>
+          <a:off x="1690086" y="1576758"/>
           <a:ext cx="8811827" cy="4759960"/>
         </p:xfrm>
         <a:graphic>
@@ -6030,13 +6534,13 @@
           <p:nvPr>
             <p:extLst>
               <p:ext uri="{D42A27DB-BD31-4B8C-83A1-F6EECF244321}">
-                <p14:modId xmlns:p14="http://schemas.microsoft.com/office/powerpoint/2010/main" val="298231014"/>
+                <p14:modId xmlns:p14="http://schemas.microsoft.com/office/powerpoint/2010/main" val="1417712448"/>
               </p:ext>
             </p:extLst>
           </p:nvPr>
         </p:nvGraphicFramePr>
         <p:xfrm>
-          <a:off x="838200" y="1576758"/>
+          <a:off x="1690086" y="1564413"/>
           <a:ext cx="8811827" cy="4942840"/>
         </p:xfrm>
         <a:graphic>

</xml_diff>